<commit_message>
Updated slide deck with notes for live demo
</commit_message>
<xml_diff>
--- a/Kotlin.pptx
+++ b/Kotlin.pptx
@@ -758,39 +758,172 @@
           <a:p>
             <a:r>
               <a:rPr lang="en-US" dirty="0" smtClean="0"/>
-              <a:t>Why</a:t>
-            </a:r>
+              <a:t>1) Create </a:t>
+            </a:r>
+            <a:r>
+              <a:rPr lang="en-US" dirty="0" err="1" smtClean="0"/>
+              <a:t>Example.kt</a:t>
+            </a:r>
+            <a:endParaRPr lang="en-US" dirty="0" smtClean="0"/>
+          </a:p>
+          <a:p>
             <a:r>
               <a:rPr lang="en-US" baseline="0" dirty="0" smtClean="0"/>
-              <a:t> do we need </a:t>
+              <a:t> -&gt; Click add </a:t>
             </a:r>
             <a:r>
               <a:rPr lang="en-US" baseline="0" dirty="0" err="1" smtClean="0"/>
-              <a:t>uodate</a:t>
+              <a:t>Kotlin</a:t>
             </a:r>
             <a:r>
               <a:rPr lang="en-US" baseline="0" dirty="0" smtClean="0"/>
-              <a:t> of Java:</a:t>
-            </a:r>
-          </a:p>
-          <a:p>
+              <a:t> to project</a:t>
+            </a:r>
+          </a:p>
+          <a:p>
+            <a:r>
+              <a:rPr lang="en-US" baseline="0" dirty="0" smtClean="0"/>
+              <a:t> -&gt; Show </a:t>
+            </a:r>
+            <a:r>
+              <a:rPr lang="en-US" baseline="0" dirty="0" err="1" smtClean="0"/>
+              <a:t>gradle</a:t>
+            </a:r>
+            <a:r>
+              <a:rPr lang="en-US" baseline="0" dirty="0" smtClean="0"/>
+              <a:t> file</a:t>
+            </a:r>
+          </a:p>
+          <a:p>
+            <a:r>
+              <a:rPr lang="en-US" baseline="0" dirty="0" smtClean="0"/>
+              <a:t>2) </a:t>
+            </a:r>
             <a:r>
               <a:rPr lang="en-US" dirty="0" smtClean="0"/>
-              <a:t>Try with resources</a:t>
-            </a:r>
-          </a:p>
-          <a:p>
-            <a:r>
-              <a:rPr lang="en-US" dirty="0" smtClean="0"/>
-              <a:t>Lambdas</a:t>
-            </a:r>
-          </a:p>
-          <a:p>
-            <a:r>
-              <a:rPr lang="en-US" dirty="0" smtClean="0"/>
-              <a:t>Streams</a:t>
-            </a:r>
-            <a:endParaRPr lang="en-US" dirty="0"/>
+              <a:t>Convert Activity</a:t>
+            </a:r>
+            <a:r>
+              <a:rPr lang="en-US" baseline="0" dirty="0" smtClean="0"/>
+              <a:t> to </a:t>
+            </a:r>
+            <a:r>
+              <a:rPr lang="en-US" baseline="0" dirty="0" err="1" smtClean="0"/>
+              <a:t>Kotlin</a:t>
+            </a:r>
+            <a:endParaRPr lang="en-US" baseline="0" dirty="0" smtClean="0"/>
+          </a:p>
+          <a:p>
+            <a:r>
+              <a:rPr lang="en-US" baseline="0" dirty="0" smtClean="0"/>
+              <a:t> -&gt; Show how click listener is converted to lambda</a:t>
+            </a:r>
+          </a:p>
+          <a:p>
+            <a:r>
+              <a:rPr lang="en-US" baseline="0" dirty="0" smtClean="0"/>
+              <a:t> -&gt; Remove menu code</a:t>
+            </a:r>
+          </a:p>
+          <a:p>
+            <a:r>
+              <a:rPr lang="en-US" baseline="0" dirty="0" smtClean="0"/>
+              <a:t>3) Give fab as constructor parameter and make it as a property</a:t>
+            </a:r>
+          </a:p>
+          <a:p>
+            <a:r>
+              <a:rPr lang="en-US" baseline="0" dirty="0" smtClean="0"/>
+              <a:t> -&gt; Move fab code into new method, using tooling</a:t>
+            </a:r>
+          </a:p>
+          <a:p>
+            <a:r>
+              <a:rPr lang="en-US" baseline="0" dirty="0" smtClean="0"/>
+              <a:t>4) Extract message and create extension method “</a:t>
+            </a:r>
+            <a:r>
+              <a:rPr lang="en-US" i="1" dirty="0" err="1" smtClean="0">
+                <a:effectLst/>
+              </a:rPr>
+              <a:t>showSnackBarOnClick</a:t>
+            </a:r>
+            <a:r>
+              <a:rPr lang="en-US" baseline="0" dirty="0" smtClean="0"/>
+              <a:t>”</a:t>
+            </a:r>
+          </a:p>
+          <a:p>
+            <a:r>
+              <a:rPr lang="en-US" baseline="0" dirty="0" smtClean="0"/>
+              <a:t> -&gt; Move extension method to separate class, pay attention to method signature</a:t>
+            </a:r>
+          </a:p>
+          <a:p>
+            <a:r>
+              <a:rPr lang="en-US" baseline="0" dirty="0" smtClean="0"/>
+              <a:t> -&gt; Show usage of “it” in 1 </a:t>
+            </a:r>
+            <a:r>
+              <a:rPr lang="en-US" baseline="0" dirty="0" err="1" smtClean="0"/>
+              <a:t>arg</a:t>
+            </a:r>
+            <a:r>
+              <a:rPr lang="en-US" baseline="0" dirty="0" smtClean="0"/>
+              <a:t> lambda</a:t>
+            </a:r>
+          </a:p>
+          <a:p>
+            <a:r>
+              <a:rPr lang="en-US" baseline="0" dirty="0" smtClean="0"/>
+              <a:t>5) Pass </a:t>
+            </a:r>
+            <a:r>
+              <a:rPr lang="en-US" baseline="0" dirty="0" err="1" smtClean="0"/>
+              <a:t>int</a:t>
+            </a:r>
+            <a:r>
+              <a:rPr lang="en-US" baseline="0" dirty="0" smtClean="0"/>
+              <a:t> instead of string and show string interpolation</a:t>
+            </a:r>
+          </a:p>
+          <a:p>
+            <a:r>
+              <a:rPr lang="en-US" baseline="0" dirty="0" smtClean="0"/>
+              <a:t>6) Change signature of extensions function to take two </a:t>
+            </a:r>
+            <a:r>
+              <a:rPr lang="en-US" baseline="0" dirty="0" err="1" smtClean="0"/>
+              <a:t>int</a:t>
+            </a:r>
+            <a:r>
+              <a:rPr lang="en-US" baseline="0" dirty="0" smtClean="0"/>
+              <a:t> and a higher order function</a:t>
+            </a:r>
+          </a:p>
+          <a:p>
+            <a:r>
+              <a:rPr lang="en-US" baseline="0" dirty="0" smtClean="0"/>
+              <a:t> -&gt; Then show usage of that method with ill places brackets around lambda’s</a:t>
+            </a:r>
+          </a:p>
+          <a:p>
+            <a:r>
+              <a:rPr lang="en-US" baseline="0" dirty="0" smtClean="0"/>
+              <a:t> -&gt; Then show intended use</a:t>
+            </a:r>
+          </a:p>
+          <a:p>
+            <a:r>
+              <a:rPr lang="en-US" baseline="0" dirty="0" smtClean="0"/>
+              <a:t>7) As a kicker show usage of default extensions of list with reduce</a:t>
+            </a:r>
+          </a:p>
+          <a:p>
+            <a:r>
+              <a:rPr lang="en-US" baseline="0" dirty="0" smtClean="0"/>
+              <a:t> -&gt; And extract lambda as function</a:t>
+            </a:r>
           </a:p>
         </p:txBody>
       </p:sp>
@@ -821,6 +954,90 @@
     <p:extLst>
       <p:ext uri="{BB962C8B-B14F-4D97-AF65-F5344CB8AC3E}">
         <p14:creationId xmlns:p14="http://schemas.microsoft.com/office/powerpoint/2010/main" val="1897541102"/>
+      </p:ext>
+    </p:extLst>
+  </p:cSld>
+  <p:clrMapOvr>
+    <a:masterClrMapping/>
+  </p:clrMapOvr>
+</p:notes>
+</file>
+
+<file path=ppt/notesSlides/notesSlide4.xml><?xml version="1.0" encoding="utf-8"?>
+<p:notes xmlns:a="http://schemas.openxmlformats.org/drawingml/2006/main" xmlns:r="http://schemas.openxmlformats.org/officeDocument/2006/relationships" xmlns:p="http://schemas.openxmlformats.org/presentationml/2006/main">
+  <p:cSld>
+    <p:spTree>
+      <p:nvGrpSpPr>
+        <p:cNvPr id="1" name=""/>
+        <p:cNvGrpSpPr/>
+        <p:nvPr/>
+      </p:nvGrpSpPr>
+      <p:grpSpPr>
+        <a:xfrm>
+          <a:off x="0" y="0"/>
+          <a:ext cx="0" cy="0"/>
+          <a:chOff x="0" y="0"/>
+          <a:chExt cx="0" cy="0"/>
+        </a:xfrm>
+      </p:grpSpPr>
+      <p:sp>
+        <p:nvSpPr>
+          <p:cNvPr id="2" name="Slide Image Placeholder 1"/>
+          <p:cNvSpPr>
+            <a:spLocks noGrp="1" noRot="1" noChangeAspect="1"/>
+          </p:cNvSpPr>
+          <p:nvPr>
+            <p:ph type="sldImg"/>
+          </p:nvPr>
+        </p:nvSpPr>
+        <p:spPr/>
+      </p:sp>
+      <p:sp>
+        <p:nvSpPr>
+          <p:cNvPr id="3" name="Notes Placeholder 2"/>
+          <p:cNvSpPr>
+            <a:spLocks noGrp="1"/>
+          </p:cNvSpPr>
+          <p:nvPr>
+            <p:ph type="body" idx="1"/>
+          </p:nvPr>
+        </p:nvSpPr>
+        <p:spPr/>
+        <p:txBody>
+          <a:bodyPr/>
+          <a:lstStyle/>
+          <a:p>
+            <a:endParaRPr lang="en-US" dirty="0"/>
+          </a:p>
+        </p:txBody>
+      </p:sp>
+      <p:sp>
+        <p:nvSpPr>
+          <p:cNvPr id="4" name="Slide Number Placeholder 3"/>
+          <p:cNvSpPr>
+            <a:spLocks noGrp="1"/>
+          </p:cNvSpPr>
+          <p:nvPr>
+            <p:ph type="sldNum" sz="quarter" idx="10"/>
+          </p:nvPr>
+        </p:nvSpPr>
+        <p:spPr/>
+        <p:txBody>
+          <a:bodyPr/>
+          <a:lstStyle/>
+          <a:p>
+            <a:fld id="{E478809B-5C58-FE4E-A5C2-E0F6DFD902F4}" type="slidenum">
+              <a:rPr lang="en-US" smtClean="0"/>
+              <a:t>12</a:t>
+            </a:fld>
+            <a:endParaRPr lang="en-US"/>
+          </a:p>
+        </p:txBody>
+      </p:sp>
+    </p:spTree>
+    <p:extLst>
+      <p:ext uri="{BB962C8B-B14F-4D97-AF65-F5344CB8AC3E}">
+        <p14:creationId xmlns:p14="http://schemas.microsoft.com/office/powerpoint/2010/main" val="1931088466"/>
       </p:ext>
     </p:extLst>
   </p:cSld>
@@ -7420,36 +7637,6 @@
           </a:p>
         </p:txBody>
       </p:sp>
-      <p:pic>
-        <p:nvPicPr>
-          <p:cNvPr id="4" name="Picture 3" descr="Screen Shot 2015-12-12 at 18.26.54.png"/>
-          <p:cNvPicPr>
-            <a:picLocks noChangeAspect="1"/>
-          </p:cNvPicPr>
-          <p:nvPr/>
-        </p:nvPicPr>
-        <p:blipFill>
-          <a:blip r:embed="rId3">
-            <a:extLst>
-              <a:ext uri="{28A0092B-C50C-407E-A947-70E740481C1C}">
-                <a14:useLocalDpi xmlns:a14="http://schemas.microsoft.com/office/drawing/2010/main" val="0"/>
-              </a:ext>
-            </a:extLst>
-          </a:blip>
-          <a:stretch>
-            <a:fillRect/>
-          </a:stretch>
-        </p:blipFill>
-        <p:spPr>
-          <a:xfrm>
-            <a:off x="4437277" y="2958685"/>
-            <a:ext cx="4706723" cy="4628854"/>
-          </a:xfrm>
-          <a:prstGeom prst="rect">
-            <a:avLst/>
-          </a:prstGeom>
-        </p:spPr>
-      </p:pic>
       <p:grpSp>
         <p:nvGrpSpPr>
           <p:cNvPr id="7" name="Group 6"/>
@@ -7571,6 +7758,36 @@
           </p:txBody>
         </p:sp>
       </p:grpSp>
+      <p:pic>
+        <p:nvPicPr>
+          <p:cNvPr id="10" name="Picture 9" descr="Screen Shot 2015-12-12 at 21.48.04.png"/>
+          <p:cNvPicPr>
+            <a:picLocks noChangeAspect="1"/>
+          </p:cNvPicPr>
+          <p:nvPr/>
+        </p:nvPicPr>
+        <p:blipFill>
+          <a:blip r:embed="rId3">
+            <a:extLst>
+              <a:ext uri="{28A0092B-C50C-407E-A947-70E740481C1C}">
+                <a14:useLocalDpi xmlns:a14="http://schemas.microsoft.com/office/drawing/2010/main" val="0"/>
+              </a:ext>
+            </a:extLst>
+          </a:blip>
+          <a:stretch>
+            <a:fillRect/>
+          </a:stretch>
+        </p:blipFill>
+        <p:spPr>
+          <a:xfrm>
+            <a:off x="457200" y="3629370"/>
+            <a:ext cx="9144000" cy="6149630"/>
+          </a:xfrm>
+          <a:prstGeom prst="rect">
+            <a:avLst/>
+          </a:prstGeom>
+        </p:spPr>
+      </p:pic>
     </p:spTree>
     <p:extLst>
       <p:ext uri="{BB962C8B-B14F-4D97-AF65-F5344CB8AC3E}">
@@ -9693,7 +9910,9 @@
       </p:grpSpPr>
       <p:sp>
         <p:nvSpPr>
-          <p:cNvPr id="9" name="Rectangle 8"/>
+          <p:cNvPr id="9" name="Rectangle 8">
+            <a:hlinkClick r:id="rId2"/>
+          </p:cNvPr>
           <p:cNvSpPr/>
           <p:nvPr/>
         </p:nvSpPr>
@@ -9862,7 +10081,21 @@
                 <a:latin typeface="Geneva"/>
                 <a:cs typeface="Geneva"/>
               </a:rPr>
-              <a:t>  The about box</a:t>
+              <a:t>  </a:t>
+            </a:r>
+            <a:r>
+              <a:rPr lang="en-US" sz="3200" dirty="0" smtClean="0">
+                <a:latin typeface="Geneva"/>
+                <a:cs typeface="Geneva"/>
+              </a:rPr>
+              <a:t>About </a:t>
+            </a:r>
+            <a:r>
+              <a:rPr lang="en-US" sz="3200" dirty="0" smtClean="0">
+                <a:latin typeface="Geneva"/>
+                <a:cs typeface="Geneva"/>
+              </a:rPr>
+              <a:t>box</a:t>
             </a:r>
             <a:endParaRPr lang="en-US" sz="3200" dirty="0">
               <a:latin typeface="Geneva"/>
@@ -9880,7 +10113,7 @@
           <p:nvPr/>
         </p:nvPicPr>
         <p:blipFill>
-          <a:blip r:embed="rId2"/>
+          <a:blip r:embed="rId3"/>
           <a:stretch>
             <a:fillRect/>
           </a:stretch>
@@ -9919,14 +10152,16 @@
       </p:pic>
       <p:pic>
         <p:nvPicPr>
-          <p:cNvPr id="5" name="Picture 4"/>
+          <p:cNvPr id="5" name="Picture 4">
+            <a:hlinkClick r:id="rId2"/>
+          </p:cNvPr>
           <p:cNvPicPr>
             <a:picLocks noChangeAspect="1"/>
           </p:cNvPicPr>
           <p:nvPr/>
         </p:nvPicPr>
         <p:blipFill rotWithShape="1">
-          <a:blip r:embed="rId3"/>
+          <a:blip r:embed="rId4"/>
           <a:srcRect r="71141"/>
           <a:stretch/>
         </p:blipFill>
@@ -9952,7 +10187,9 @@
       </p:pic>
       <p:sp>
         <p:nvSpPr>
-          <p:cNvPr id="10" name="Rectangle 9"/>
+          <p:cNvPr id="10" name="Rectangle 9">
+            <a:hlinkClick r:id="rId5"/>
+          </p:cNvPr>
           <p:cNvSpPr/>
           <p:nvPr/>
         </p:nvSpPr>
@@ -9998,11 +10235,11 @@
           <a:p>
             <a:pPr algn="ctr"/>
             <a:r>
-              <a:rPr lang="en-US" sz="3200" dirty="0" err="1" smtClean="0">
+              <a:rPr lang="en-US" sz="3200" dirty="0" smtClean="0">
                 <a:latin typeface="Geneva"/>
                 <a:cs typeface="Geneva"/>
               </a:rPr>
-              <a:t>www.endran.nl</a:t>
+              <a:t>www.endran.nl </a:t>
             </a:r>
             <a:endParaRPr lang="en-US" sz="3200" dirty="0">
               <a:latin typeface="Geneva"/>

</xml_diff>

<commit_message>
Added notes of fragmented podcast
</commit_message>
<xml_diff>
--- a/Kotlin.pptx
+++ b/Kotlin.pptx
@@ -5,7 +5,7 @@
     <p:sldMasterId id="2147483648" r:id="rId1"/>
   </p:sldMasterIdLst>
   <p:notesMasterIdLst>
-    <p:notesMasterId r:id="rId19"/>
+    <p:notesMasterId r:id="rId20"/>
   </p:notesMasterIdLst>
   <p:sldIdLst>
     <p:sldId id="256" r:id="rId2"/>
@@ -20,11 +20,12 @@
     <p:sldId id="269" r:id="rId11"/>
     <p:sldId id="270" r:id="rId12"/>
     <p:sldId id="261" r:id="rId13"/>
-    <p:sldId id="271" r:id="rId14"/>
-    <p:sldId id="263" r:id="rId15"/>
-    <p:sldId id="273" r:id="rId16"/>
-    <p:sldId id="272" r:id="rId17"/>
-    <p:sldId id="264" r:id="rId18"/>
+    <p:sldId id="274" r:id="rId14"/>
+    <p:sldId id="271" r:id="rId15"/>
+    <p:sldId id="263" r:id="rId16"/>
+    <p:sldId id="273" r:id="rId17"/>
+    <p:sldId id="272" r:id="rId18"/>
+    <p:sldId id="264" r:id="rId19"/>
   </p:sldIdLst>
   <p:sldSz cx="9144000" cy="6858000" type="screen4x3"/>
   <p:notesSz cx="6858000" cy="9144000"/>
@@ -797,6 +798,77 @@
           <a:p>
             <a:r>
               <a:rPr lang="en-US" baseline="0" dirty="0" smtClean="0"/>
+              <a:t> -&gt; add: </a:t>
+            </a:r>
+            <a:r>
+              <a:rPr lang="en-US" dirty="0" err="1" smtClean="0"/>
+              <a:t>classpath</a:t>
+            </a:r>
+            <a:r>
+              <a:rPr lang="en-US" dirty="0" smtClean="0"/>
+              <a:t> </a:t>
+            </a:r>
+            <a:r>
+              <a:rPr lang="en-US" sz="1200" b="1" kern="1200" dirty="0" smtClean="0">
+                <a:solidFill>
+                  <a:schemeClr val="tx1"/>
+                </a:solidFill>
+                <a:effectLst/>
+                <a:latin typeface="+mn-lt"/>
+                <a:ea typeface="+mn-ea"/>
+                <a:cs typeface="+mn-cs"/>
+              </a:rPr>
+              <a:t>"</a:t>
+            </a:r>
+            <a:r>
+              <a:rPr lang="en-US" sz="1200" b="1" kern="1200" dirty="0" err="1" smtClean="0">
+                <a:solidFill>
+                  <a:schemeClr val="tx1"/>
+                </a:solidFill>
+                <a:effectLst/>
+                <a:latin typeface="+mn-lt"/>
+                <a:ea typeface="+mn-ea"/>
+                <a:cs typeface="+mn-cs"/>
+              </a:rPr>
+              <a:t>org.jetbrains.kotlin:kotlin-android-extensions</a:t>
+            </a:r>
+            <a:r>
+              <a:rPr lang="en-US" sz="1200" b="1" kern="1200" dirty="0" smtClean="0">
+                <a:solidFill>
+                  <a:schemeClr val="tx1"/>
+                </a:solidFill>
+                <a:effectLst/>
+                <a:latin typeface="+mn-lt"/>
+                <a:ea typeface="+mn-ea"/>
+                <a:cs typeface="+mn-cs"/>
+              </a:rPr>
+              <a:t>:</a:t>
+            </a:r>
+            <a:r>
+              <a:rPr lang="en-US" dirty="0" smtClean="0"/>
+              <a:t>$</a:t>
+            </a:r>
+            <a:r>
+              <a:rPr lang="en-US" dirty="0" err="1" smtClean="0"/>
+              <a:t>kotlin_version</a:t>
+            </a:r>
+            <a:r>
+              <a:rPr lang="en-US" sz="1200" b="1" kern="1200" dirty="0" smtClean="0">
+                <a:solidFill>
+                  <a:schemeClr val="tx1"/>
+                </a:solidFill>
+                <a:effectLst/>
+                <a:latin typeface="+mn-lt"/>
+                <a:ea typeface="+mn-ea"/>
+                <a:cs typeface="+mn-cs"/>
+              </a:rPr>
+              <a:t>"</a:t>
+            </a:r>
+            <a:endParaRPr lang="en-US" baseline="0" dirty="0" smtClean="0"/>
+          </a:p>
+          <a:p>
+            <a:r>
+              <a:rPr lang="en-US" baseline="0" dirty="0" smtClean="0"/>
               <a:t>2) </a:t>
             </a:r>
             <a:r>
@@ -816,7 +888,23 @@
           <a:p>
             <a:r>
               <a:rPr lang="en-US" baseline="0" dirty="0" smtClean="0"/>
-              <a:t> -&gt; Show how click listener is converted to lambda</a:t>
+              <a:t> -&gt; Show how click listener is converted to lambda (Explain lambda </a:t>
+            </a:r>
+            <a:r>
+              <a:rPr lang="en-US" baseline="0" dirty="0" err="1" smtClean="0"/>
+              <a:t>vs</a:t>
+            </a:r>
+            <a:r>
+              <a:rPr lang="en-US" baseline="0" dirty="0" smtClean="0"/>
+              <a:t> </a:t>
+            </a:r>
+            <a:r>
+              <a:rPr lang="en-US" baseline="0" dirty="0" err="1" smtClean="0"/>
+              <a:t>annon</a:t>
+            </a:r>
+            <a:r>
+              <a:rPr lang="en-US" baseline="0" dirty="0" smtClean="0"/>
+              <a:t> inner class and outer class reference)</a:t>
             </a:r>
           </a:p>
           <a:p>
@@ -924,6 +1012,17 @@
               <a:rPr lang="en-US" baseline="0" dirty="0" smtClean="0"/>
               <a:t> -&gt; And extract lambda as function</a:t>
             </a:r>
+          </a:p>
+          <a:p>
+            <a:r>
+              <a:rPr lang="en-US" baseline="0" dirty="0" smtClean="0"/>
+              <a:t> -&gt; Perhaps some </a:t>
+            </a:r>
+            <a:r>
+              <a:rPr lang="en-US" baseline="0" dirty="0" err="1" smtClean="0"/>
+              <a:t>inlining</a:t>
+            </a:r>
+            <a:endParaRPr lang="en-US" baseline="0" dirty="0" smtClean="0"/>
           </a:p>
         </p:txBody>
       </p:sp>
@@ -1007,6 +1106,240 @@
           <a:bodyPr/>
           <a:lstStyle/>
           <a:p>
+            <a:r>
+              <a:rPr lang="en-US" dirty="0" smtClean="0"/>
+              <a:t>The need to stuck to</a:t>
+            </a:r>
+            <a:r>
+              <a:rPr lang="en-US" baseline="0" dirty="0" smtClean="0"/>
+              <a:t> Java, since the majority of their code base (IDE’s (All of their IDE’s </a:t>
+            </a:r>
+            <a:r>
+              <a:rPr lang="en-US" baseline="0" dirty="0" err="1" smtClean="0"/>
+              <a:t>execpt</a:t>
+            </a:r>
+            <a:r>
+              <a:rPr lang="en-US" baseline="0" dirty="0" smtClean="0"/>
+              <a:t> for C# is on the JVM)) depend on Java. They needed to overcome some issues with Java.</a:t>
+            </a:r>
+          </a:p>
+          <a:p>
+            <a:r>
+              <a:rPr lang="en-US" baseline="0" dirty="0" smtClean="0"/>
+              <a:t>At the time ‘</a:t>
+            </a:r>
+            <a:r>
+              <a:rPr lang="en-US" baseline="0" dirty="0" err="1" smtClean="0"/>
+              <a:t>Scala</a:t>
+            </a:r>
+            <a:r>
+              <a:rPr lang="en-US" baseline="0" dirty="0" smtClean="0"/>
+              <a:t>’ was there, but it wasn’t for them.</a:t>
+            </a:r>
+          </a:p>
+          <a:p>
+            <a:r>
+              <a:rPr lang="en-US" baseline="0" dirty="0" smtClean="0"/>
+              <a:t>The primary reason to development was for internal use.</a:t>
+            </a:r>
+          </a:p>
+          <a:p>
+            <a:endParaRPr lang="en-US" baseline="0" dirty="0" smtClean="0"/>
+          </a:p>
+          <a:p>
+            <a:r>
+              <a:rPr lang="en-US" baseline="0" dirty="0" smtClean="0"/>
+              <a:t>Apache 2.0 licenses -&gt; open source</a:t>
+            </a:r>
+          </a:p>
+          <a:p>
+            <a:endParaRPr lang="en-US" baseline="0" dirty="0" smtClean="0"/>
+          </a:p>
+          <a:p>
+            <a:r>
+              <a:rPr lang="en-US" baseline="0" dirty="0" smtClean="0"/>
+              <a:t>Interoperation with Java was key for </a:t>
+            </a:r>
+            <a:r>
+              <a:rPr lang="en-US" baseline="0" dirty="0" err="1" smtClean="0"/>
+              <a:t>Jetbrains</a:t>
+            </a:r>
+            <a:r>
+              <a:rPr lang="en-US" baseline="0" dirty="0" smtClean="0"/>
+              <a:t>. Some of their own tools already have </a:t>
+            </a:r>
+            <a:r>
+              <a:rPr lang="en-US" baseline="0" dirty="0" err="1" smtClean="0"/>
+              <a:t>Kotlin</a:t>
+            </a:r>
+            <a:r>
+              <a:rPr lang="en-US" baseline="0" dirty="0" smtClean="0"/>
+              <a:t>, live in the field/production.</a:t>
+            </a:r>
+          </a:p>
+          <a:p>
+            <a:endParaRPr lang="en-US" baseline="0" dirty="0" smtClean="0"/>
+          </a:p>
+          <a:p>
+            <a:r>
+              <a:rPr lang="en-US" baseline="0" dirty="0" smtClean="0"/>
+              <a:t>Name comes from an island near St. Petersburg. They have a main </a:t>
+            </a:r>
+            <a:r>
+              <a:rPr lang="en-US" baseline="0" dirty="0" err="1" smtClean="0"/>
+              <a:t>RnD</a:t>
+            </a:r>
+            <a:r>
+              <a:rPr lang="en-US" baseline="0" dirty="0" smtClean="0"/>
+              <a:t> office there.</a:t>
+            </a:r>
+          </a:p>
+          <a:p>
+            <a:endParaRPr lang="en-US" baseline="0" dirty="0" smtClean="0"/>
+          </a:p>
+          <a:p>
+            <a:r>
+              <a:rPr lang="en-US" baseline="0" dirty="0" smtClean="0"/>
+              <a:t>Statically typed, like Java. Tooling for </a:t>
+            </a:r>
+            <a:r>
+              <a:rPr lang="en-US" baseline="0" dirty="0" err="1" smtClean="0"/>
+              <a:t>staitically</a:t>
+            </a:r>
+            <a:r>
+              <a:rPr lang="en-US" baseline="0" dirty="0" smtClean="0"/>
+              <a:t> </a:t>
+            </a:r>
+            <a:r>
+              <a:rPr lang="en-US" baseline="0" dirty="0" err="1" smtClean="0"/>
+              <a:t>tpyes</a:t>
+            </a:r>
+            <a:r>
+              <a:rPr lang="en-US" baseline="0" dirty="0" smtClean="0"/>
+              <a:t> languages of way easier. Also development is less complex.</a:t>
+            </a:r>
+          </a:p>
+          <a:p>
+            <a:r>
+              <a:rPr lang="en-US" baseline="0" dirty="0" err="1" smtClean="0"/>
+              <a:t>Kotlin</a:t>
+            </a:r>
+            <a:r>
+              <a:rPr lang="en-US" baseline="0" dirty="0" smtClean="0"/>
+              <a:t> has to be </a:t>
+            </a:r>
+            <a:r>
+              <a:rPr lang="en-US" baseline="0" dirty="0" err="1" smtClean="0"/>
+              <a:t>consince</a:t>
+            </a:r>
+            <a:r>
+              <a:rPr lang="en-US" baseline="0" dirty="0" smtClean="0"/>
+              <a:t>, so that</a:t>
+            </a:r>
+            <a:r>
+              <a:rPr lang="fr-FR" baseline="0" dirty="0" smtClean="0"/>
+              <a:t>’</a:t>
+            </a:r>
+            <a:r>
+              <a:rPr lang="en-US" baseline="0" dirty="0" smtClean="0"/>
+              <a:t>s why type inference comes in. So no over </a:t>
+            </a:r>
+            <a:r>
+              <a:rPr lang="en-US" baseline="0" dirty="0" err="1" smtClean="0"/>
+              <a:t>explict</a:t>
+            </a:r>
+            <a:r>
+              <a:rPr lang="en-US" baseline="0" dirty="0" smtClean="0"/>
+              <a:t> type notation. Cuts down on boilerplate code.</a:t>
+            </a:r>
+          </a:p>
+          <a:p>
+            <a:endParaRPr lang="en-US" baseline="0" dirty="0" smtClean="0"/>
+          </a:p>
+          <a:p>
+            <a:r>
+              <a:rPr lang="en-US" baseline="0" dirty="0" smtClean="0"/>
+              <a:t>By default classes are immutable, final. Which causes less inheritance and there are other paradigms to create the same functionality, in a better way.</a:t>
+            </a:r>
+          </a:p>
+          <a:p>
+            <a:endParaRPr lang="en-US" baseline="0" dirty="0" smtClean="0"/>
+          </a:p>
+          <a:p>
+            <a:r>
+              <a:rPr lang="en-US" dirty="0" err="1" smtClean="0"/>
+              <a:t>Kotlin</a:t>
+            </a:r>
+            <a:r>
+              <a:rPr lang="en-US" baseline="0" dirty="0" smtClean="0"/>
+              <a:t> is optimized for </a:t>
+            </a:r>
+            <a:r>
+              <a:rPr lang="en-US" baseline="0" dirty="0" err="1" smtClean="0"/>
+              <a:t>toolabilty</a:t>
+            </a:r>
+            <a:r>
+              <a:rPr lang="en-US" baseline="0" dirty="0" smtClean="0"/>
+              <a:t>, and less verbose, more explicit code. The compile time is slightly slower then Java, but becoming faster with every version. At run time is is the same as Java, or even faster since it compiles down to more efficient code.</a:t>
+            </a:r>
+          </a:p>
+          <a:p>
+            <a:r>
+              <a:rPr lang="en-US" baseline="0" dirty="0" err="1" smtClean="0"/>
+              <a:t>Kotlin</a:t>
+            </a:r>
+            <a:r>
+              <a:rPr lang="en-US" baseline="0" dirty="0" smtClean="0"/>
+              <a:t> does not have it’s own web framework or other basic stuff. They rely on existing (Java) libraries, often with a thin </a:t>
+            </a:r>
+            <a:r>
+              <a:rPr lang="en-US" baseline="0" dirty="0" err="1" smtClean="0"/>
+              <a:t>Kotlin</a:t>
+            </a:r>
+            <a:r>
+              <a:rPr lang="en-US" baseline="0" dirty="0" smtClean="0"/>
+              <a:t> facade. All Java libraries work for </a:t>
+            </a:r>
+            <a:r>
+              <a:rPr lang="en-US" baseline="0" dirty="0" err="1" smtClean="0"/>
+              <a:t>Kotlin</a:t>
+            </a:r>
+            <a:r>
+              <a:rPr lang="en-US" baseline="0" dirty="0" smtClean="0"/>
+              <a:t>, including annotation processors.</a:t>
+            </a:r>
+          </a:p>
+          <a:p>
+            <a:endParaRPr lang="en-US" baseline="0" dirty="0" smtClean="0"/>
+          </a:p>
+          <a:p>
+            <a:endParaRPr lang="en-US" baseline="0" dirty="0" smtClean="0"/>
+          </a:p>
+          <a:p>
+            <a:endParaRPr lang="en-US" baseline="0" dirty="0" smtClean="0"/>
+          </a:p>
+          <a:p>
+            <a:r>
+              <a:rPr lang="en-US" baseline="0" dirty="0" smtClean="0"/>
+              <a:t>The new power of </a:t>
+            </a:r>
+            <a:r>
+              <a:rPr lang="en-US" baseline="0" dirty="0" err="1" smtClean="0"/>
+              <a:t>Kotlin</a:t>
+            </a:r>
+            <a:r>
+              <a:rPr lang="en-US" baseline="0" dirty="0" smtClean="0"/>
+              <a:t> on the Java 6 JVM open a whole new world for Android developers. Enjoy all the new good stuff </a:t>
+            </a:r>
+            <a:r>
+              <a:rPr lang="en-US" baseline="0" dirty="0" smtClean="0">
+                <a:sym typeface="Wingdings"/>
+              </a:rPr>
+              <a:t></a:t>
+            </a:r>
+            <a:endParaRPr lang="en-US" baseline="0" dirty="0" smtClean="0"/>
+          </a:p>
+          <a:p>
             <a:endParaRPr lang="en-US" dirty="0"/>
           </a:p>
         </p:txBody>
@@ -1038,6 +1371,174 @@
     <p:extLst>
       <p:ext uri="{BB962C8B-B14F-4D97-AF65-F5344CB8AC3E}">
         <p14:creationId xmlns:p14="http://schemas.microsoft.com/office/powerpoint/2010/main" val="1931088466"/>
+      </p:ext>
+    </p:extLst>
+  </p:cSld>
+  <p:clrMapOvr>
+    <a:masterClrMapping/>
+  </p:clrMapOvr>
+</p:notes>
+</file>
+
+<file path=ppt/notesSlides/notesSlide5.xml><?xml version="1.0" encoding="utf-8"?>
+<p:notes xmlns:a="http://schemas.openxmlformats.org/drawingml/2006/main" xmlns:r="http://schemas.openxmlformats.org/officeDocument/2006/relationships" xmlns:p="http://schemas.openxmlformats.org/presentationml/2006/main">
+  <p:cSld>
+    <p:spTree>
+      <p:nvGrpSpPr>
+        <p:cNvPr id="1" name=""/>
+        <p:cNvGrpSpPr/>
+        <p:nvPr/>
+      </p:nvGrpSpPr>
+      <p:grpSpPr>
+        <a:xfrm>
+          <a:off x="0" y="0"/>
+          <a:ext cx="0" cy="0"/>
+          <a:chOff x="0" y="0"/>
+          <a:chExt cx="0" cy="0"/>
+        </a:xfrm>
+      </p:grpSpPr>
+      <p:sp>
+        <p:nvSpPr>
+          <p:cNvPr id="2" name="Slide Image Placeholder 1"/>
+          <p:cNvSpPr>
+            <a:spLocks noGrp="1" noRot="1" noChangeAspect="1"/>
+          </p:cNvSpPr>
+          <p:nvPr>
+            <p:ph type="sldImg"/>
+          </p:nvPr>
+        </p:nvSpPr>
+        <p:spPr/>
+      </p:sp>
+      <p:sp>
+        <p:nvSpPr>
+          <p:cNvPr id="3" name="Notes Placeholder 2"/>
+          <p:cNvSpPr>
+            <a:spLocks noGrp="1"/>
+          </p:cNvSpPr>
+          <p:nvPr>
+            <p:ph type="body" idx="1"/>
+          </p:nvPr>
+        </p:nvSpPr>
+        <p:spPr/>
+        <p:txBody>
+          <a:bodyPr/>
+          <a:lstStyle/>
+          <a:p>
+            <a:endParaRPr lang="en-US" dirty="0"/>
+          </a:p>
+        </p:txBody>
+      </p:sp>
+      <p:sp>
+        <p:nvSpPr>
+          <p:cNvPr id="4" name="Slide Number Placeholder 3"/>
+          <p:cNvSpPr>
+            <a:spLocks noGrp="1"/>
+          </p:cNvSpPr>
+          <p:nvPr>
+            <p:ph type="sldNum" sz="quarter" idx="10"/>
+          </p:nvPr>
+        </p:nvSpPr>
+        <p:spPr/>
+        <p:txBody>
+          <a:bodyPr/>
+          <a:lstStyle/>
+          <a:p>
+            <a:fld id="{E478809B-5C58-FE4E-A5C2-E0F6DFD902F4}" type="slidenum">
+              <a:rPr lang="en-US" smtClean="0"/>
+              <a:t>13</a:t>
+            </a:fld>
+            <a:endParaRPr lang="en-US"/>
+          </a:p>
+        </p:txBody>
+      </p:sp>
+    </p:spTree>
+    <p:extLst>
+      <p:ext uri="{BB962C8B-B14F-4D97-AF65-F5344CB8AC3E}">
+        <p14:creationId xmlns:p14="http://schemas.microsoft.com/office/powerpoint/2010/main" val="1931088466"/>
+      </p:ext>
+    </p:extLst>
+  </p:cSld>
+  <p:clrMapOvr>
+    <a:masterClrMapping/>
+  </p:clrMapOvr>
+</p:notes>
+</file>
+
+<file path=ppt/notesSlides/notesSlide6.xml><?xml version="1.0" encoding="utf-8"?>
+<p:notes xmlns:a="http://schemas.openxmlformats.org/drawingml/2006/main" xmlns:r="http://schemas.openxmlformats.org/officeDocument/2006/relationships" xmlns:p="http://schemas.openxmlformats.org/presentationml/2006/main">
+  <p:cSld>
+    <p:spTree>
+      <p:nvGrpSpPr>
+        <p:cNvPr id="1" name=""/>
+        <p:cNvGrpSpPr/>
+        <p:nvPr/>
+      </p:nvGrpSpPr>
+      <p:grpSpPr>
+        <a:xfrm>
+          <a:off x="0" y="0"/>
+          <a:ext cx="0" cy="0"/>
+          <a:chOff x="0" y="0"/>
+          <a:chExt cx="0" cy="0"/>
+        </a:xfrm>
+      </p:grpSpPr>
+      <p:sp>
+        <p:nvSpPr>
+          <p:cNvPr id="2" name="Slide Image Placeholder 1"/>
+          <p:cNvSpPr>
+            <a:spLocks noGrp="1" noRot="1" noChangeAspect="1"/>
+          </p:cNvSpPr>
+          <p:nvPr>
+            <p:ph type="sldImg"/>
+          </p:nvPr>
+        </p:nvSpPr>
+        <p:spPr/>
+      </p:sp>
+      <p:sp>
+        <p:nvSpPr>
+          <p:cNvPr id="3" name="Notes Placeholder 2"/>
+          <p:cNvSpPr>
+            <a:spLocks noGrp="1"/>
+          </p:cNvSpPr>
+          <p:nvPr>
+            <p:ph type="body" idx="1"/>
+          </p:nvPr>
+        </p:nvSpPr>
+        <p:spPr/>
+        <p:txBody>
+          <a:bodyPr/>
+          <a:lstStyle/>
+          <a:p>
+            <a:endParaRPr lang="en-US" dirty="0"/>
+          </a:p>
+        </p:txBody>
+      </p:sp>
+      <p:sp>
+        <p:nvSpPr>
+          <p:cNvPr id="4" name="Slide Number Placeholder 3"/>
+          <p:cNvSpPr>
+            <a:spLocks noGrp="1"/>
+          </p:cNvSpPr>
+          <p:nvPr>
+            <p:ph type="sldNum" sz="quarter" idx="10"/>
+          </p:nvPr>
+        </p:nvSpPr>
+        <p:spPr/>
+        <p:txBody>
+          <a:bodyPr/>
+          <a:lstStyle/>
+          <a:p>
+            <a:fld id="{E478809B-5C58-FE4E-A5C2-E0F6DFD902F4}" type="slidenum">
+              <a:rPr lang="en-US" smtClean="0"/>
+              <a:t>16</a:t>
+            </a:fld>
+            <a:endParaRPr lang="en-US"/>
+          </a:p>
+        </p:txBody>
+      </p:sp>
+    </p:spTree>
+    <p:extLst>
+      <p:ext uri="{BB962C8B-B14F-4D97-AF65-F5344CB8AC3E}">
+        <p14:creationId xmlns:p14="http://schemas.microsoft.com/office/powerpoint/2010/main" val="1586264394"/>
       </p:ext>
     </p:extLst>
   </p:cSld>
@@ -7259,17 +7760,15 @@
           <a:lstStyle/>
           <a:p>
             <a:r>
-              <a:rPr lang="en-US" dirty="0" smtClean="0">
+              <a:rPr lang="en-US" dirty="0" err="1" smtClean="0">
                 <a:solidFill>
                   <a:schemeClr val="bg1"/>
                 </a:solidFill>
                 <a:latin typeface="Geneva"/>
                 <a:cs typeface="Geneva"/>
               </a:rPr>
-              <a:t>Backing parties, Jake Wharton</a:t>
-            </a:r>
-          </a:p>
-          <a:p>
+              <a:t>Developped</a:t>
+            </a:r>
             <a:r>
               <a:rPr lang="en-US" dirty="0" smtClean="0">
                 <a:solidFill>
@@ -7278,8 +7777,63 @@
                 <a:latin typeface="Geneva"/>
                 <a:cs typeface="Geneva"/>
               </a:rPr>
-              <a:t>Optimized for tooling</a:t>
-            </a:r>
+              <a:t> by </a:t>
+            </a:r>
+            <a:r>
+              <a:rPr lang="en-US" dirty="0" err="1" smtClean="0">
+                <a:solidFill>
+                  <a:schemeClr val="bg1"/>
+                </a:solidFill>
+                <a:latin typeface="Geneva"/>
+                <a:cs typeface="Geneva"/>
+              </a:rPr>
+              <a:t>Jetbrains</a:t>
+            </a:r>
+            <a:endParaRPr lang="en-US" dirty="0" smtClean="0">
+              <a:solidFill>
+                <a:schemeClr val="bg1"/>
+              </a:solidFill>
+              <a:latin typeface="Geneva"/>
+              <a:cs typeface="Geneva"/>
+            </a:endParaRPr>
+          </a:p>
+          <a:p>
+            <a:r>
+              <a:rPr lang="en-US" dirty="0" smtClean="0">
+                <a:solidFill>
+                  <a:schemeClr val="bg1"/>
+                </a:solidFill>
+                <a:latin typeface="Geneva"/>
+                <a:cs typeface="Geneva"/>
+              </a:rPr>
+              <a:t>Development started 5 to 6 years ago</a:t>
+            </a:r>
+            <a:endParaRPr lang="en-US" dirty="0" smtClean="0">
+              <a:solidFill>
+                <a:schemeClr val="bg1"/>
+              </a:solidFill>
+              <a:latin typeface="Geneva"/>
+              <a:cs typeface="Geneva"/>
+            </a:endParaRPr>
+          </a:p>
+          <a:p>
+            <a:r>
+              <a:rPr lang="en-US" dirty="0" smtClean="0">
+                <a:solidFill>
+                  <a:schemeClr val="bg1"/>
+                </a:solidFill>
+                <a:latin typeface="Geneva"/>
+                <a:cs typeface="Geneva"/>
+              </a:rPr>
+              <a:t>Targets the JVM, compiles to byte code</a:t>
+            </a:r>
+            <a:endParaRPr lang="en-US" dirty="0" smtClean="0">
+              <a:solidFill>
+                <a:schemeClr val="bg1"/>
+              </a:solidFill>
+              <a:latin typeface="Geneva"/>
+              <a:cs typeface="Geneva"/>
+            </a:endParaRPr>
           </a:p>
           <a:p>
             <a:r>
@@ -7458,6 +8012,256 @@
 </file>
 
 <file path=ppt/slides/slide13.xml><?xml version="1.0" encoding="utf-8"?>
+<p:sld xmlns:a="http://schemas.openxmlformats.org/drawingml/2006/main" xmlns:r="http://schemas.openxmlformats.org/officeDocument/2006/relationships" xmlns:p="http://schemas.openxmlformats.org/presentationml/2006/main">
+  <p:cSld>
+    <p:spTree>
+      <p:nvGrpSpPr>
+        <p:cNvPr id="1" name=""/>
+        <p:cNvGrpSpPr/>
+        <p:nvPr/>
+      </p:nvGrpSpPr>
+      <p:grpSpPr>
+        <a:xfrm>
+          <a:off x="0" y="0"/>
+          <a:ext cx="0" cy="0"/>
+          <a:chOff x="0" y="0"/>
+          <a:chExt cx="0" cy="0"/>
+        </a:xfrm>
+      </p:grpSpPr>
+      <p:sp>
+        <p:nvSpPr>
+          <p:cNvPr id="2" name="Title 1"/>
+          <p:cNvSpPr>
+            <a:spLocks noGrp="1"/>
+          </p:cNvSpPr>
+          <p:nvPr>
+            <p:ph type="title"/>
+          </p:nvPr>
+        </p:nvSpPr>
+        <p:spPr/>
+        <p:txBody>
+          <a:bodyPr/>
+          <a:lstStyle/>
+          <a:p>
+            <a:endParaRPr lang="en-US"/>
+          </a:p>
+        </p:txBody>
+      </p:sp>
+      <p:sp>
+        <p:nvSpPr>
+          <p:cNvPr id="3" name="Content Placeholder 2"/>
+          <p:cNvSpPr>
+            <a:spLocks noGrp="1"/>
+          </p:cNvSpPr>
+          <p:nvPr>
+            <p:ph idx="1"/>
+          </p:nvPr>
+        </p:nvSpPr>
+        <p:spPr/>
+        <p:txBody>
+          <a:bodyPr/>
+          <a:lstStyle/>
+          <a:p>
+            <a:r>
+              <a:rPr lang="en-US" dirty="0" smtClean="0">
+                <a:solidFill>
+                  <a:schemeClr val="bg1"/>
+                </a:solidFill>
+                <a:latin typeface="Geneva"/>
+                <a:cs typeface="Geneva"/>
+              </a:rPr>
+              <a:t>Backing parties, Jake Wharton</a:t>
+            </a:r>
+          </a:p>
+          <a:p>
+            <a:r>
+              <a:rPr lang="en-US" dirty="0" smtClean="0">
+                <a:solidFill>
+                  <a:schemeClr val="bg1"/>
+                </a:solidFill>
+                <a:latin typeface="Geneva"/>
+                <a:cs typeface="Geneva"/>
+              </a:rPr>
+              <a:t>Optimized for tooling</a:t>
+            </a:r>
+          </a:p>
+          <a:p>
+            <a:r>
+              <a:rPr lang="en-US" dirty="0" err="1" smtClean="0">
+                <a:solidFill>
+                  <a:schemeClr val="bg1"/>
+                </a:solidFill>
+                <a:latin typeface="Geneva"/>
+                <a:cs typeface="Geneva"/>
+              </a:rPr>
+              <a:t>Jetbrains</a:t>
+            </a:r>
+            <a:r>
+              <a:rPr lang="en-US" dirty="0" smtClean="0">
+                <a:solidFill>
+                  <a:schemeClr val="bg1"/>
+                </a:solidFill>
+                <a:latin typeface="Geneva"/>
+                <a:cs typeface="Geneva"/>
+              </a:rPr>
+              <a:t>.. So here to stay</a:t>
+            </a:r>
+          </a:p>
+          <a:p>
+            <a:pPr lvl="1"/>
+            <a:r>
+              <a:rPr lang="en-US" dirty="0" smtClean="0">
+                <a:solidFill>
+                  <a:schemeClr val="bg1"/>
+                </a:solidFill>
+                <a:latin typeface="Geneva"/>
+                <a:cs typeface="Geneva"/>
+              </a:rPr>
+              <a:t>More than a non-profit thing, they depend on it. Selling idea’s is their business</a:t>
+            </a:r>
+          </a:p>
+          <a:p>
+            <a:pPr lvl="1"/>
+            <a:r>
+              <a:rPr lang="en-US" dirty="0" err="1" smtClean="0">
+                <a:solidFill>
+                  <a:schemeClr val="bg1"/>
+                </a:solidFill>
+                <a:latin typeface="Geneva"/>
+                <a:cs typeface="Geneva"/>
+              </a:rPr>
+              <a:t>Kotlin</a:t>
+            </a:r>
+            <a:r>
+              <a:rPr lang="en-US" dirty="0" smtClean="0">
+                <a:solidFill>
+                  <a:schemeClr val="bg1"/>
+                </a:solidFill>
+                <a:latin typeface="Geneva"/>
+                <a:cs typeface="Geneva"/>
+              </a:rPr>
+              <a:t> is optimized for </a:t>
+            </a:r>
+            <a:r>
+              <a:rPr lang="en-US" dirty="0" err="1" smtClean="0">
+                <a:solidFill>
+                  <a:schemeClr val="bg1"/>
+                </a:solidFill>
+                <a:latin typeface="Geneva"/>
+                <a:cs typeface="Geneva"/>
+              </a:rPr>
+              <a:t>toolability</a:t>
+            </a:r>
+            <a:endParaRPr lang="en-US" dirty="0" smtClean="0">
+              <a:solidFill>
+                <a:schemeClr val="bg1"/>
+              </a:solidFill>
+              <a:latin typeface="Geneva"/>
+              <a:cs typeface="Geneva"/>
+            </a:endParaRPr>
+          </a:p>
+        </p:txBody>
+      </p:sp>
+      <p:sp>
+        <p:nvSpPr>
+          <p:cNvPr id="8" name="Rectangle 7"/>
+          <p:cNvSpPr/>
+          <p:nvPr/>
+        </p:nvSpPr>
+        <p:spPr>
+          <a:xfrm>
+            <a:off x="0" y="-94570"/>
+            <a:ext cx="9144000" cy="972718"/>
+          </a:xfrm>
+          <a:prstGeom prst="rect">
+            <a:avLst/>
+          </a:prstGeom>
+          <a:solidFill>
+            <a:srgbClr val="C1285B"/>
+          </a:solidFill>
+          <a:ln>
+            <a:noFill/>
+          </a:ln>
+          <a:effectLst>
+            <a:outerShdw blurRad="40000" dist="23000" dir="2700000" rotWithShape="0">
+              <a:srgbClr val="000000">
+                <a:alpha val="35000"/>
+              </a:srgbClr>
+            </a:outerShdw>
+          </a:effectLst>
+        </p:spPr>
+        <p:style>
+          <a:lnRef idx="1">
+            <a:schemeClr val="accent1"/>
+          </a:lnRef>
+          <a:fillRef idx="3">
+            <a:schemeClr val="accent1"/>
+          </a:fillRef>
+          <a:effectRef idx="2">
+            <a:schemeClr val="accent1"/>
+          </a:effectRef>
+          <a:fontRef idx="minor">
+            <a:schemeClr val="lt1"/>
+          </a:fontRef>
+        </p:style>
+        <p:txBody>
+          <a:bodyPr rtlCol="0" anchor="ctr"/>
+          <a:lstStyle/>
+          <a:p>
+            <a:r>
+              <a:rPr lang="en-US" sz="3200" dirty="0" smtClean="0">
+                <a:latin typeface="Geneva"/>
+                <a:cs typeface="Geneva"/>
+              </a:rPr>
+              <a:t>  Why </a:t>
+            </a:r>
+            <a:r>
+              <a:rPr lang="en-US" sz="3200" dirty="0" err="1" smtClean="0">
+                <a:latin typeface="Geneva"/>
+                <a:cs typeface="Geneva"/>
+              </a:rPr>
+              <a:t>Kotlin</a:t>
+            </a:r>
+            <a:endParaRPr lang="en-US" sz="3200" dirty="0">
+              <a:latin typeface="Geneva"/>
+              <a:cs typeface="Geneva"/>
+            </a:endParaRPr>
+          </a:p>
+        </p:txBody>
+      </p:sp>
+    </p:spTree>
+    <p:extLst>
+      <p:ext uri="{BB962C8B-B14F-4D97-AF65-F5344CB8AC3E}">
+        <p14:creationId xmlns:p14="http://schemas.microsoft.com/office/powerpoint/2010/main" val="4249669190"/>
+      </p:ext>
+    </p:extLst>
+  </p:cSld>
+  <p:clrMapOvr>
+    <a:masterClrMapping/>
+  </p:clrMapOvr>
+  <mc:AlternateContent xmlns:mc="http://schemas.openxmlformats.org/markup-compatibility/2006" xmlns:p14="http://schemas.microsoft.com/office/powerpoint/2010/main">
+    <mc:Choice Requires="p14">
+      <p:transition p14:dur="400">
+        <p:wipe/>
+      </p:transition>
+    </mc:Choice>
+    <mc:Fallback xmlns="">
+      <p:transition xmlns:p14="http://schemas.microsoft.com/office/powerpoint/2010/main">
+        <p:wipe/>
+      </p:transition>
+    </mc:Fallback>
+  </mc:AlternateContent>
+  <p:timing>
+    <p:tnLst>
+      <p:par>
+        <p:cTn xmlns:p14="http://schemas.microsoft.com/office/powerpoint/2010/main" id="1" dur="indefinite" restart="never" nodeType="tmRoot"/>
+      </p:par>
+    </p:tnLst>
+  </p:timing>
+</p:sld>
+</file>
+
+<file path=ppt/slides/slide14.xml><?xml version="1.0" encoding="utf-8"?>
 <p:sld xmlns:a="http://schemas.openxmlformats.org/drawingml/2006/main" xmlns:r="http://schemas.openxmlformats.org/officeDocument/2006/relationships" xmlns:p="http://schemas.openxmlformats.org/presentationml/2006/main">
   <p:cSld>
     <p:spTree>
@@ -7937,7 +8741,7 @@
 </p:sld>
 </file>
 
-<file path=ppt/slides/slide14.xml><?xml version="1.0" encoding="utf-8"?>
+<file path=ppt/slides/slide15.xml><?xml version="1.0" encoding="utf-8"?>
 <p:sld xmlns:a="http://schemas.openxmlformats.org/drawingml/2006/main" xmlns:r="http://schemas.openxmlformats.org/officeDocument/2006/relationships" xmlns:p="http://schemas.openxmlformats.org/presentationml/2006/main">
   <p:cSld>
     <p:spTree>
@@ -8340,7 +9144,7 @@
 </p:sld>
 </file>
 
-<file path=ppt/slides/slide15.xml><?xml version="1.0" encoding="utf-8"?>
+<file path=ppt/slides/slide16.xml><?xml version="1.0" encoding="utf-8"?>
 <p:sld xmlns:a="http://schemas.openxmlformats.org/drawingml/2006/main" xmlns:r="http://schemas.openxmlformats.org/officeDocument/2006/relationships" xmlns:p="http://schemas.openxmlformats.org/presentationml/2006/main">
   <p:cSld>
     <p:spTree>
@@ -8457,17 +9261,47 @@
                 <a:latin typeface="Geneva"/>
                 <a:cs typeface="Geneva"/>
               </a:rPr>
-              <a:t>Fragmented podcast with guys from </a:t>
-            </a:r>
-            <a:r>
-              <a:rPr lang="en-US" dirty="0" err="1" smtClean="0">
+              <a:t>Fragmented podcast with </a:t>
+            </a:r>
+            <a:r>
+              <a:rPr lang="en-US" dirty="0" err="1">
                 <a:solidFill>
                   <a:schemeClr val="bg1"/>
                 </a:solidFill>
                 <a:latin typeface="Geneva"/>
                 <a:cs typeface="Geneva"/>
               </a:rPr>
-              <a:t>IntelliJ</a:t>
+              <a:t>Hadi</a:t>
+            </a:r>
+            <a:r>
+              <a:rPr lang="en-US" dirty="0">
+                <a:solidFill>
+                  <a:schemeClr val="bg1"/>
+                </a:solidFill>
+                <a:latin typeface="Geneva"/>
+                <a:cs typeface="Geneva"/>
+              </a:rPr>
+              <a:t> </a:t>
+            </a:r>
+            <a:r>
+              <a:rPr lang="en-US" dirty="0" smtClean="0">
+                <a:solidFill>
+                  <a:schemeClr val="bg1"/>
+                </a:solidFill>
+                <a:latin typeface="Geneva"/>
+                <a:cs typeface="Geneva"/>
+              </a:rPr>
+              <a:t>Hariri from </a:t>
+            </a:r>
+            <a:r>
+              <a:rPr lang="en-US" dirty="0" err="1" smtClean="0">
+                <a:solidFill>
+                  <a:schemeClr val="bg1"/>
+                </a:solidFill>
+                <a:latin typeface="Geneva"/>
+                <a:cs typeface="Geneva"/>
+              </a:rPr>
+              <a:t>Jetbrains</a:t>
             </a:r>
             <a:endParaRPr lang="en-US" dirty="0" smtClean="0">
               <a:solidFill>
@@ -8497,7 +9331,7 @@
                 </a:solidFill>
                 <a:latin typeface="Geneva"/>
                 <a:cs typeface="Geneva"/>
-                <a:hlinkClick r:id="rId2"/>
+                <a:hlinkClick r:id="rId3"/>
               </a:rPr>
               <a:t>http://fragmentedpodcast.com/episodes/20</a:t>
             </a:r>
@@ -8508,7 +9342,7 @@
                 </a:solidFill>
                 <a:latin typeface="Geneva"/>
                 <a:cs typeface="Geneva"/>
-                <a:hlinkClick r:id="rId2"/>
+                <a:hlinkClick r:id="rId3"/>
               </a:rPr>
               <a:t>/</a:t>
             </a:r>
@@ -8595,7 +9429,7 @@
       <p:sp>
         <p:nvSpPr>
           <p:cNvPr id="6" name="Oval 5">
-            <a:hlinkClick r:id="rId2"/>
+            <a:hlinkClick r:id="rId3"/>
           </p:cNvPr>
           <p:cNvSpPr/>
           <p:nvPr/>
@@ -8648,7 +9482,7 @@
       <p:sp>
         <p:nvSpPr>
           <p:cNvPr id="7" name="Right Arrow 6">
-            <a:hlinkClick r:id="rId2"/>
+            <a:hlinkClick r:id="rId3"/>
           </p:cNvPr>
           <p:cNvSpPr/>
           <p:nvPr/>
@@ -8730,7 +9564,7 @@
 </p:sld>
 </file>
 
-<file path=ppt/slides/slide16.xml><?xml version="1.0" encoding="utf-8"?>
+<file path=ppt/slides/slide17.xml><?xml version="1.0" encoding="utf-8"?>
 <p:sld xmlns:a="http://schemas.openxmlformats.org/drawingml/2006/main" xmlns:r="http://schemas.openxmlformats.org/officeDocument/2006/relationships" xmlns:p="http://schemas.openxmlformats.org/presentationml/2006/main">
   <p:cSld>
     <p:spTree>
@@ -9207,7 +10041,7 @@
 </p:sld>
 </file>
 
-<file path=ppt/slides/slide17.xml><?xml version="1.0" encoding="utf-8"?>
+<file path=ppt/slides/slide18.xml><?xml version="1.0" encoding="utf-8"?>
 <p:sld xmlns:a="http://schemas.openxmlformats.org/drawingml/2006/main" xmlns:r="http://schemas.openxmlformats.org/officeDocument/2006/relationships" xmlns:p="http://schemas.openxmlformats.org/presentationml/2006/main">
   <p:cSld>
     <p:spTree>

</xml_diff>